<commit_message>
Updated Figures. Added new figures.
</commit_message>
<xml_diff>
--- a/Figures/figure.pptx
+++ b/Figures/figure.pptx
@@ -12,6 +12,10 @@
     <p:sldId id="264" r:id="rId6"/>
     <p:sldId id="265" r:id="rId7"/>
     <p:sldId id="266" r:id="rId8"/>
+    <p:sldId id="267" r:id="rId9"/>
+    <p:sldId id="268" r:id="rId10"/>
+    <p:sldId id="269" r:id="rId11"/>
+    <p:sldId id="270" r:id="rId12"/>
   </p:sldIdLst>
   <p:sldSz cx="18897600" cy="14173200"/>
   <p:notesSz cx="6858000" cy="9144000"/>
@@ -4402,6 +4406,722 @@
 </p:sld>
 </file>
 
+<file path=ppt/slides/slide10.xml><?xml version="1.0" encoding="utf-8"?>
+<p:sld xmlns:a="http://schemas.openxmlformats.org/drawingml/2006/main" xmlns:r="http://schemas.openxmlformats.org/officeDocument/2006/relationships" xmlns:p="http://schemas.openxmlformats.org/presentationml/2006/main">
+  <p:cSld>
+    <p:spTree>
+      <p:nvGrpSpPr>
+        <p:cNvPr id="1" name=""/>
+        <p:cNvGrpSpPr/>
+        <p:nvPr/>
+      </p:nvGrpSpPr>
+      <p:grpSpPr>
+        <a:xfrm>
+          <a:off x="0" y="0"/>
+          <a:ext cx="0" cy="0"/>
+          <a:chOff x="0" y="0"/>
+          <a:chExt cx="0" cy="0"/>
+        </a:xfrm>
+      </p:grpSpPr>
+      <p:grpSp>
+        <p:nvGrpSpPr>
+          <p:cNvPr id="14" name="Group 13"/>
+          <p:cNvGrpSpPr/>
+          <p:nvPr/>
+        </p:nvGrpSpPr>
+        <p:grpSpPr>
+          <a:xfrm>
+            <a:off x="5644992" y="3658585"/>
+            <a:ext cx="7279944" cy="4579911"/>
+            <a:chOff x="3051230" y="2519265"/>
+            <a:chExt cx="7279944" cy="4579911"/>
+          </a:xfrm>
+        </p:grpSpPr>
+        <p:sp>
+          <p:nvSpPr>
+            <p:cNvPr id="15" name="Rounded Rectangle 14"/>
+            <p:cNvSpPr/>
+            <p:nvPr/>
+          </p:nvSpPr>
+          <p:spPr>
+            <a:xfrm>
+              <a:off x="3051230" y="2519265"/>
+              <a:ext cx="7279944" cy="4112430"/>
+            </a:xfrm>
+            <a:prstGeom prst="roundRect">
+              <a:avLst/>
+            </a:prstGeom>
+            <a:solidFill>
+              <a:schemeClr val="accent6"/>
+            </a:solidFill>
+            <a:ln/>
+          </p:spPr>
+          <p:style>
+            <a:lnRef idx="2">
+              <a:schemeClr val="accent6">
+                <a:shade val="50000"/>
+              </a:schemeClr>
+            </a:lnRef>
+            <a:fillRef idx="1">
+              <a:schemeClr val="accent6"/>
+            </a:fillRef>
+            <a:effectRef idx="0">
+              <a:schemeClr val="accent6"/>
+            </a:effectRef>
+            <a:fontRef idx="minor">
+              <a:schemeClr val="lt1"/>
+            </a:fontRef>
+          </p:style>
+          <p:txBody>
+            <a:bodyPr rtlCol="0" anchor="ctr"/>
+            <a:lstStyle/>
+            <a:p>
+              <a:pPr algn="ctr"/>
+              <a:endParaRPr lang="en-US" sz="2669"/>
+            </a:p>
+          </p:txBody>
+        </p:sp>
+        <p:sp>
+          <p:nvSpPr>
+            <p:cNvPr id="16" name="Rounded Rectangle 15"/>
+            <p:cNvSpPr/>
+            <p:nvPr/>
+          </p:nvSpPr>
+          <p:spPr>
+            <a:xfrm>
+              <a:off x="3051230" y="3310325"/>
+              <a:ext cx="7279944" cy="3788851"/>
+            </a:xfrm>
+            <a:prstGeom prst="roundRect">
+              <a:avLst/>
+            </a:prstGeom>
+            <a:ln>
+              <a:solidFill>
+                <a:schemeClr val="accent6"/>
+              </a:solidFill>
+            </a:ln>
+          </p:spPr>
+          <p:style>
+            <a:lnRef idx="2">
+              <a:schemeClr val="dk1"/>
+            </a:lnRef>
+            <a:fillRef idx="1">
+              <a:schemeClr val="lt1"/>
+            </a:fillRef>
+            <a:effectRef idx="0">
+              <a:schemeClr val="dk1"/>
+            </a:effectRef>
+            <a:fontRef idx="minor">
+              <a:schemeClr val="dk1"/>
+            </a:fontRef>
+          </p:style>
+          <p:txBody>
+            <a:bodyPr rtlCol="0" anchor="ctr"/>
+            <a:lstStyle/>
+            <a:p>
+              <a:pPr algn="ctr"/>
+              <a:endParaRPr lang="en-US" sz="2669"/>
+            </a:p>
+          </p:txBody>
+        </p:sp>
+        <p:sp>
+          <p:nvSpPr>
+            <p:cNvPr id="17" name="Rectangle 16"/>
+            <p:cNvSpPr/>
+            <p:nvPr/>
+          </p:nvSpPr>
+          <p:spPr>
+            <a:xfrm>
+              <a:off x="3051230" y="3170664"/>
+              <a:ext cx="7279944" cy="977891"/>
+            </a:xfrm>
+            <a:prstGeom prst="rect">
+              <a:avLst/>
+            </a:prstGeom>
+            <a:solidFill>
+              <a:schemeClr val="tx2">
+                <a:lumMod val="40000"/>
+                <a:lumOff val="60000"/>
+              </a:schemeClr>
+            </a:solidFill>
+            <a:ln>
+              <a:solidFill>
+                <a:schemeClr val="accent6"/>
+              </a:solidFill>
+            </a:ln>
+          </p:spPr>
+          <p:style>
+            <a:lnRef idx="2">
+              <a:schemeClr val="accent1">
+                <a:shade val="50000"/>
+              </a:schemeClr>
+            </a:lnRef>
+            <a:fillRef idx="1">
+              <a:schemeClr val="accent1"/>
+            </a:fillRef>
+            <a:effectRef idx="0">
+              <a:schemeClr val="accent1"/>
+            </a:effectRef>
+            <a:fontRef idx="minor">
+              <a:schemeClr val="lt1"/>
+            </a:fontRef>
+          </p:style>
+          <p:txBody>
+            <a:bodyPr rot="0" spcFirstLastPara="0" vertOverflow="overflow" horzOverflow="overflow" vert="horz" wrap="square" lIns="35721" tIns="17860" rIns="35721" bIns="17860" numCol="1" spcCol="0" rtlCol="0" fromWordArt="0" anchor="ctr" anchorCtr="0" forceAA="0" compatLnSpc="1">
+              <a:prstTxWarp prst="textNoShape">
+                <a:avLst/>
+              </a:prstTxWarp>
+              <a:noAutofit/>
+            </a:bodyPr>
+            <a:lstStyle/>
+            <a:p>
+              <a:pPr algn="ctr"/>
+              <a:endParaRPr lang="en-US" sz="2669"/>
+            </a:p>
+          </p:txBody>
+        </p:sp>
+        <p:sp>
+          <p:nvSpPr>
+            <p:cNvPr id="18" name="TextBox 17"/>
+            <p:cNvSpPr txBox="1"/>
+            <p:nvPr/>
+          </p:nvSpPr>
+          <p:spPr>
+            <a:xfrm>
+              <a:off x="5365454" y="3367221"/>
+              <a:ext cx="2716385" cy="584775"/>
+            </a:xfrm>
+            <a:prstGeom prst="rect">
+              <a:avLst/>
+            </a:prstGeom>
+            <a:noFill/>
+          </p:spPr>
+          <p:txBody>
+            <a:bodyPr wrap="none" rtlCol="0">
+              <a:spAutoFit/>
+            </a:bodyPr>
+            <a:lstStyle/>
+            <a:p>
+              <a:r>
+                <a:rPr lang="en-US" sz="3200" b="1" dirty="0" err="1"/>
+                <a:t>new_customer</a:t>
+              </a:r>
+              <a:endParaRPr lang="en-US" sz="3200" b="1" dirty="0"/>
+            </a:p>
+          </p:txBody>
+        </p:sp>
+        <p:sp>
+          <p:nvSpPr>
+            <p:cNvPr id="19" name="TextBox 18"/>
+            <p:cNvSpPr txBox="1"/>
+            <p:nvPr/>
+          </p:nvSpPr>
+          <p:spPr>
+            <a:xfrm>
+              <a:off x="3522235" y="4418745"/>
+              <a:ext cx="3740255" cy="2246769"/>
+            </a:xfrm>
+            <a:prstGeom prst="rect">
+              <a:avLst/>
+            </a:prstGeom>
+            <a:noFill/>
+          </p:spPr>
+          <p:txBody>
+            <a:bodyPr wrap="none" rtlCol="0">
+              <a:spAutoFit/>
+            </a:bodyPr>
+            <a:lstStyle/>
+            <a:p>
+              <a:r>
+                <a:rPr lang="en-US" sz="2800" b="1" dirty="0" err="1"/>
+                <a:t>CustomerName</a:t>
+              </a:r>
+              <a:endParaRPr lang="en-US" sz="2800" b="1" dirty="0"/>
+            </a:p>
+            <a:p>
+              <a:r>
+                <a:rPr lang="en-US" sz="2800" dirty="0" err="1"/>
+                <a:t>CommunicationMethod</a:t>
+              </a:r>
+              <a:endParaRPr lang="en-US" sz="2800" dirty="0"/>
+            </a:p>
+            <a:p>
+              <a:r>
+                <a:rPr lang="en-US" sz="2800" dirty="0" err="1"/>
+                <a:t>LeadSource</a:t>
+              </a:r>
+              <a:endParaRPr lang="en-US" sz="2800" dirty="0"/>
+            </a:p>
+            <a:p>
+              <a:r>
+                <a:rPr lang="en-US" sz="2800" dirty="0"/>
+                <a:t>Destination</a:t>
+              </a:r>
+            </a:p>
+            <a:p>
+              <a:r>
+                <a:rPr lang="en-US" sz="2800" dirty="0" err="1"/>
+                <a:t>LaunchLocation</a:t>
+              </a:r>
+              <a:endParaRPr lang="en-US" sz="2800" dirty="0"/>
+            </a:p>
+          </p:txBody>
+        </p:sp>
+        <p:sp>
+          <p:nvSpPr>
+            <p:cNvPr id="20" name="TextBox 19"/>
+            <p:cNvSpPr txBox="1"/>
+            <p:nvPr/>
+          </p:nvSpPr>
+          <p:spPr>
+            <a:xfrm>
+              <a:off x="8453609" y="4418745"/>
+              <a:ext cx="1299651" cy="2246769"/>
+            </a:xfrm>
+            <a:prstGeom prst="rect">
+              <a:avLst/>
+            </a:prstGeom>
+            <a:noFill/>
+          </p:spPr>
+          <p:txBody>
+            <a:bodyPr wrap="none" rtlCol="0">
+              <a:spAutoFit/>
+            </a:bodyPr>
+            <a:lstStyle/>
+            <a:p>
+              <a:pPr algn="r"/>
+              <a:r>
+                <a:rPr lang="en-US" sz="2800" b="1" dirty="0"/>
+                <a:t>varchar</a:t>
+              </a:r>
+            </a:p>
+            <a:p>
+              <a:pPr algn="r"/>
+              <a:r>
+                <a:rPr lang="en-US" sz="2800" dirty="0"/>
+                <a:t>varchar</a:t>
+              </a:r>
+            </a:p>
+            <a:p>
+              <a:pPr algn="r"/>
+              <a:r>
+                <a:rPr lang="en-US" sz="2800" dirty="0"/>
+                <a:t>varchar</a:t>
+              </a:r>
+            </a:p>
+            <a:p>
+              <a:pPr algn="r"/>
+              <a:r>
+                <a:rPr lang="en-US" sz="2800" dirty="0"/>
+                <a:t>varchar</a:t>
+              </a:r>
+            </a:p>
+            <a:p>
+              <a:pPr algn="r"/>
+              <a:r>
+                <a:rPr lang="en-US" sz="2800" dirty="0"/>
+                <a:t>varchar</a:t>
+              </a:r>
+            </a:p>
+          </p:txBody>
+        </p:sp>
+        <p:pic>
+          <p:nvPicPr>
+            <p:cNvPr id="21" name="Picture 2" descr="Free Key SVG, PNG Icon, Symbol. Download Image."/>
+            <p:cNvPicPr>
+              <a:picLocks noChangeAspect="1" noChangeArrowheads="1"/>
+            </p:cNvPicPr>
+            <p:nvPr/>
+          </p:nvPicPr>
+          <p:blipFill>
+            <a:blip r:embed="rId2" cstate="print">
+              <a:extLst>
+                <a:ext uri="{28A0092B-C50C-407E-A947-70E740481C1C}">
+                  <a14:useLocalDpi xmlns:a14="http://schemas.microsoft.com/office/drawing/2010/main" val="0"/>
+                </a:ext>
+              </a:extLst>
+            </a:blip>
+            <a:srcRect/>
+            <a:stretch>
+              <a:fillRect/>
+            </a:stretch>
+          </p:blipFill>
+          <p:spPr bwMode="auto">
+            <a:xfrm>
+              <a:off x="3187840" y="4466340"/>
+              <a:ext cx="334395" cy="334395"/>
+            </a:xfrm>
+            <a:prstGeom prst="rect">
+              <a:avLst/>
+            </a:prstGeom>
+            <a:noFill/>
+            <a:ln>
+              <a:noFill/>
+            </a:ln>
+            <a:extLst>
+              <a:ext uri="{909E8E84-426E-40DD-AFC4-6F175D3DCCD1}">
+                <a14:hiddenFill xmlns:a14="http://schemas.microsoft.com/office/drawing/2010/main">
+                  <a:solidFill>
+                    <a:srgbClr val="FFFFFF"/>
+                  </a:solidFill>
+                </a14:hiddenFill>
+              </a:ext>
+            </a:extLst>
+          </p:spPr>
+        </p:pic>
+      </p:grpSp>
+    </p:spTree>
+    <p:extLst>
+      <p:ext uri="{BB962C8B-B14F-4D97-AF65-F5344CB8AC3E}">
+        <p14:creationId xmlns:p14="http://schemas.microsoft.com/office/powerpoint/2010/main" val="2918898228"/>
+      </p:ext>
+    </p:extLst>
+  </p:cSld>
+  <p:clrMapOvr>
+    <a:masterClrMapping/>
+  </p:clrMapOvr>
+</p:sld>
+</file>
+
+<file path=ppt/slides/slide11.xml><?xml version="1.0" encoding="utf-8"?>
+<p:sld xmlns:a="http://schemas.openxmlformats.org/drawingml/2006/main" xmlns:r="http://schemas.openxmlformats.org/officeDocument/2006/relationships" xmlns:p="http://schemas.openxmlformats.org/presentationml/2006/main">
+  <p:cSld>
+    <p:spTree>
+      <p:nvGrpSpPr>
+        <p:cNvPr id="1" name=""/>
+        <p:cNvGrpSpPr/>
+        <p:nvPr/>
+      </p:nvGrpSpPr>
+      <p:grpSpPr>
+        <a:xfrm>
+          <a:off x="0" y="0"/>
+          <a:ext cx="0" cy="0"/>
+          <a:chOff x="0" y="0"/>
+          <a:chExt cx="0" cy="0"/>
+        </a:xfrm>
+      </p:grpSpPr>
+      <p:grpSp>
+        <p:nvGrpSpPr>
+          <p:cNvPr id="10" name="Group 9"/>
+          <p:cNvGrpSpPr/>
+          <p:nvPr/>
+        </p:nvGrpSpPr>
+        <p:grpSpPr>
+          <a:xfrm>
+            <a:off x="6122313" y="5067853"/>
+            <a:ext cx="5091928" cy="3097545"/>
+            <a:chOff x="10019779" y="2829654"/>
+            <a:chExt cx="5091928" cy="3097545"/>
+          </a:xfrm>
+        </p:grpSpPr>
+        <p:sp>
+          <p:nvSpPr>
+            <p:cNvPr id="11" name="Rounded Rectangle 10"/>
+            <p:cNvSpPr/>
+            <p:nvPr/>
+          </p:nvSpPr>
+          <p:spPr>
+            <a:xfrm>
+              <a:off x="10019779" y="2829654"/>
+              <a:ext cx="5091928" cy="3097545"/>
+            </a:xfrm>
+            <a:prstGeom prst="roundRect">
+              <a:avLst/>
+            </a:prstGeom>
+            <a:solidFill>
+              <a:srgbClr val="FF0000"/>
+            </a:solidFill>
+            <a:ln>
+              <a:solidFill>
+                <a:srgbClr val="FF0000"/>
+              </a:solidFill>
+            </a:ln>
+          </p:spPr>
+          <p:style>
+            <a:lnRef idx="2">
+              <a:schemeClr val="accent2">
+                <a:shade val="50000"/>
+              </a:schemeClr>
+            </a:lnRef>
+            <a:fillRef idx="1">
+              <a:schemeClr val="accent2"/>
+            </a:fillRef>
+            <a:effectRef idx="0">
+              <a:schemeClr val="accent2"/>
+            </a:effectRef>
+            <a:fontRef idx="minor">
+              <a:schemeClr val="lt1"/>
+            </a:fontRef>
+          </p:style>
+          <p:txBody>
+            <a:bodyPr rtlCol="0" anchor="ctr"/>
+            <a:lstStyle/>
+            <a:p>
+              <a:pPr algn="ctr"/>
+              <a:endParaRPr lang="en-US" sz="2669"/>
+            </a:p>
+          </p:txBody>
+        </p:sp>
+        <p:sp>
+          <p:nvSpPr>
+            <p:cNvPr id="12" name="Rounded Rectangle 11"/>
+            <p:cNvSpPr/>
+            <p:nvPr/>
+          </p:nvSpPr>
+          <p:spPr>
+            <a:xfrm>
+              <a:off x="10019779" y="3443513"/>
+              <a:ext cx="5091928" cy="2483686"/>
+            </a:xfrm>
+            <a:prstGeom prst="roundRect">
+              <a:avLst/>
+            </a:prstGeom>
+            <a:ln>
+              <a:solidFill>
+                <a:srgbClr val="FF0000"/>
+              </a:solidFill>
+            </a:ln>
+          </p:spPr>
+          <p:style>
+            <a:lnRef idx="2">
+              <a:schemeClr val="dk1"/>
+            </a:lnRef>
+            <a:fillRef idx="1">
+              <a:schemeClr val="lt1"/>
+            </a:fillRef>
+            <a:effectRef idx="0">
+              <a:schemeClr val="dk1"/>
+            </a:effectRef>
+            <a:fontRef idx="minor">
+              <a:schemeClr val="dk1"/>
+            </a:fontRef>
+          </p:style>
+          <p:txBody>
+            <a:bodyPr rtlCol="0" anchor="ctr"/>
+            <a:lstStyle/>
+            <a:p>
+              <a:pPr algn="ctr"/>
+              <a:endParaRPr lang="en-US" sz="2669"/>
+            </a:p>
+          </p:txBody>
+        </p:sp>
+        <p:sp>
+          <p:nvSpPr>
+            <p:cNvPr id="13" name="Rectangle 12"/>
+            <p:cNvSpPr/>
+            <p:nvPr/>
+          </p:nvSpPr>
+          <p:spPr>
+            <a:xfrm>
+              <a:off x="10019779" y="3437983"/>
+              <a:ext cx="5091928" cy="1021215"/>
+            </a:xfrm>
+            <a:prstGeom prst="rect">
+              <a:avLst/>
+            </a:prstGeom>
+            <a:solidFill>
+              <a:schemeClr val="tx2">
+                <a:lumMod val="40000"/>
+                <a:lumOff val="60000"/>
+              </a:schemeClr>
+            </a:solidFill>
+            <a:ln>
+              <a:solidFill>
+                <a:srgbClr val="FF0000"/>
+              </a:solidFill>
+            </a:ln>
+          </p:spPr>
+          <p:style>
+            <a:lnRef idx="2">
+              <a:schemeClr val="accent1">
+                <a:shade val="50000"/>
+              </a:schemeClr>
+            </a:lnRef>
+            <a:fillRef idx="1">
+              <a:schemeClr val="accent1"/>
+            </a:fillRef>
+            <a:effectRef idx="0">
+              <a:schemeClr val="accent1"/>
+            </a:effectRef>
+            <a:fontRef idx="minor">
+              <a:schemeClr val="lt1"/>
+            </a:fontRef>
+          </p:style>
+          <p:txBody>
+            <a:bodyPr rot="0" spcFirstLastPara="0" vertOverflow="overflow" horzOverflow="overflow" vert="horz" wrap="square" lIns="35721" tIns="17860" rIns="35721" bIns="17860" numCol="1" spcCol="0" rtlCol="0" fromWordArt="0" anchor="ctr" anchorCtr="0" forceAA="0" compatLnSpc="1">
+              <a:prstTxWarp prst="textNoShape">
+                <a:avLst/>
+              </a:prstTxWarp>
+              <a:noAutofit/>
+            </a:bodyPr>
+            <a:lstStyle/>
+            <a:p>
+              <a:pPr algn="ctr"/>
+              <a:endParaRPr lang="en-US" sz="2669"/>
+            </a:p>
+          </p:txBody>
+        </p:sp>
+        <p:pic>
+          <p:nvPicPr>
+            <p:cNvPr id="22" name="Picture 2" descr="Free Key SVG, PNG Icon, Symbol. Download Image."/>
+            <p:cNvPicPr>
+              <a:picLocks noChangeAspect="1" noChangeArrowheads="1"/>
+            </p:cNvPicPr>
+            <p:nvPr/>
+          </p:nvPicPr>
+          <p:blipFill>
+            <a:blip r:embed="rId2" cstate="print">
+              <a:extLst>
+                <a:ext uri="{28A0092B-C50C-407E-A947-70E740481C1C}">
+                  <a14:useLocalDpi xmlns:a14="http://schemas.microsoft.com/office/drawing/2010/main" val="0"/>
+                </a:ext>
+              </a:extLst>
+            </a:blip>
+            <a:srcRect/>
+            <a:stretch>
+              <a:fillRect/>
+            </a:stretch>
+          </p:blipFill>
+          <p:spPr bwMode="auto">
+            <a:xfrm>
+              <a:off x="10176893" y="4664552"/>
+              <a:ext cx="334395" cy="334395"/>
+            </a:xfrm>
+            <a:prstGeom prst="rect">
+              <a:avLst/>
+            </a:prstGeom>
+            <a:noFill/>
+            <a:ln>
+              <a:noFill/>
+            </a:ln>
+            <a:extLst>
+              <a:ext uri="{909E8E84-426E-40DD-AFC4-6F175D3DCCD1}">
+                <a14:hiddenFill xmlns:a14="http://schemas.microsoft.com/office/drawing/2010/main">
+                  <a:solidFill>
+                    <a:srgbClr val="FFFFFF"/>
+                  </a:solidFill>
+                </a14:hiddenFill>
+              </a:ext>
+            </a:extLst>
+          </p:spPr>
+        </p:pic>
+        <p:sp>
+          <p:nvSpPr>
+            <p:cNvPr id="23" name="Rectangle 22"/>
+            <p:cNvSpPr/>
+            <p:nvPr/>
+          </p:nvSpPr>
+          <p:spPr>
+            <a:xfrm>
+              <a:off x="10925312" y="3661304"/>
+              <a:ext cx="3499035" cy="584775"/>
+            </a:xfrm>
+            <a:prstGeom prst="rect">
+              <a:avLst/>
+            </a:prstGeom>
+          </p:spPr>
+          <p:txBody>
+            <a:bodyPr wrap="none">
+              <a:spAutoFit/>
+            </a:bodyPr>
+            <a:lstStyle/>
+            <a:p>
+              <a:r>
+                <a:rPr lang="en-US" sz="3200" b="1" dirty="0" err="1"/>
+                <a:t>agent_rank_tracker</a:t>
+              </a:r>
+              <a:endParaRPr lang="en-US" sz="3200" dirty="0"/>
+            </a:p>
+          </p:txBody>
+        </p:sp>
+        <p:sp>
+          <p:nvSpPr>
+            <p:cNvPr id="24" name="Rectangle 23"/>
+            <p:cNvSpPr/>
+            <p:nvPr/>
+          </p:nvSpPr>
+          <p:spPr>
+            <a:xfrm>
+              <a:off x="10571263" y="4582304"/>
+              <a:ext cx="1857475" cy="954107"/>
+            </a:xfrm>
+            <a:prstGeom prst="rect">
+              <a:avLst/>
+            </a:prstGeom>
+          </p:spPr>
+          <p:txBody>
+            <a:bodyPr wrap="square">
+              <a:spAutoFit/>
+            </a:bodyPr>
+            <a:lstStyle/>
+            <a:p>
+              <a:r>
+                <a:rPr lang="en-US" sz="2800" b="1" dirty="0" err="1"/>
+                <a:t>AgentID</a:t>
+              </a:r>
+              <a:endParaRPr lang="en-US" sz="2800" b="1" dirty="0"/>
+            </a:p>
+            <a:p>
+              <a:r>
+                <a:rPr lang="en-US" sz="2800" dirty="0" err="1"/>
+                <a:t>agent_rank</a:t>
+              </a:r>
+              <a:endParaRPr lang="en-US" sz="2800" dirty="0"/>
+            </a:p>
+          </p:txBody>
+        </p:sp>
+        <p:sp>
+          <p:nvSpPr>
+            <p:cNvPr id="25" name="Rectangle 24"/>
+            <p:cNvSpPr/>
+            <p:nvPr/>
+          </p:nvSpPr>
+          <p:spPr>
+            <a:xfrm>
+              <a:off x="13926489" y="4559446"/>
+              <a:ext cx="810137" cy="954107"/>
+            </a:xfrm>
+            <a:prstGeom prst="rect">
+              <a:avLst/>
+            </a:prstGeom>
+          </p:spPr>
+          <p:txBody>
+            <a:bodyPr wrap="square">
+              <a:spAutoFit/>
+            </a:bodyPr>
+            <a:lstStyle/>
+            <a:p>
+              <a:pPr algn="r"/>
+              <a:r>
+                <a:rPr lang="en-US" sz="2800" b="1" dirty="0" err="1" smtClean="0"/>
+                <a:t>int</a:t>
+              </a:r>
+              <a:endParaRPr lang="en-US" sz="2800" b="1" dirty="0" smtClean="0"/>
+            </a:p>
+            <a:p>
+              <a:pPr algn="r"/>
+              <a:r>
+                <a:rPr lang="en-US" sz="2800" dirty="0" err="1" smtClean="0"/>
+                <a:t>int</a:t>
+              </a:r>
+              <a:endParaRPr lang="en-US" sz="2800" dirty="0"/>
+            </a:p>
+          </p:txBody>
+        </p:sp>
+      </p:grpSp>
+    </p:spTree>
+    <p:extLst>
+      <p:ext uri="{BB962C8B-B14F-4D97-AF65-F5344CB8AC3E}">
+        <p14:creationId xmlns:p14="http://schemas.microsoft.com/office/powerpoint/2010/main" val="1066873971"/>
+      </p:ext>
+    </p:extLst>
+  </p:cSld>
+  <p:clrMapOvr>
+    <a:masterClrMapping/>
+  </p:clrMapOvr>
+</p:sld>
+</file>
+
 <file path=ppt/slides/slide2.xml><?xml version="1.0" encoding="utf-8"?>
 <p:sld xmlns:a="http://schemas.openxmlformats.org/drawingml/2006/main" xmlns:r="http://schemas.openxmlformats.org/officeDocument/2006/relationships" xmlns:p="http://schemas.openxmlformats.org/presentationml/2006/main">
   <p:cSld>
@@ -4872,7 +5592,6 @@
                 <a:rPr lang="en-US" sz="2800" dirty="0"/>
                 <a:t>float</a:t>
               </a:r>
-              <a:endParaRPr lang="en-US" sz="2800" dirty="0"/>
             </a:p>
           </p:txBody>
         </p:sp>
@@ -10161,6 +10880,863 @@
 </p:sld>
 </file>
 
+<file path=ppt/slides/slide8.xml><?xml version="1.0" encoding="utf-8"?>
+<p:sld xmlns:a="http://schemas.openxmlformats.org/drawingml/2006/main" xmlns:r="http://schemas.openxmlformats.org/officeDocument/2006/relationships" xmlns:p="http://schemas.openxmlformats.org/presentationml/2006/main">
+  <p:cSld>
+    <p:spTree>
+      <p:nvGrpSpPr>
+        <p:cNvPr id="1" name=""/>
+        <p:cNvGrpSpPr/>
+        <p:nvPr/>
+      </p:nvGrpSpPr>
+      <p:grpSpPr>
+        <a:xfrm>
+          <a:off x="0" y="0"/>
+          <a:ext cx="0" cy="0"/>
+          <a:chOff x="0" y="0"/>
+          <a:chExt cx="0" cy="0"/>
+        </a:xfrm>
+      </p:grpSpPr>
+      <p:grpSp>
+        <p:nvGrpSpPr>
+          <p:cNvPr id="4" name="Group 3"/>
+          <p:cNvGrpSpPr/>
+          <p:nvPr/>
+        </p:nvGrpSpPr>
+        <p:grpSpPr>
+          <a:xfrm>
+            <a:off x="6117464" y="3940401"/>
+            <a:ext cx="5857124" cy="4745232"/>
+            <a:chOff x="12903316" y="1602228"/>
+            <a:chExt cx="5857124" cy="4745232"/>
+          </a:xfrm>
+        </p:grpSpPr>
+        <p:sp>
+          <p:nvSpPr>
+            <p:cNvPr id="5" name="Rounded Rectangle 4"/>
+            <p:cNvSpPr/>
+            <p:nvPr/>
+          </p:nvSpPr>
+          <p:spPr>
+            <a:xfrm>
+              <a:off x="12903317" y="1602228"/>
+              <a:ext cx="5857123" cy="3259332"/>
+            </a:xfrm>
+            <a:prstGeom prst="roundRect">
+              <a:avLst/>
+            </a:prstGeom>
+            <a:ln>
+              <a:solidFill>
+                <a:srgbClr val="5B9BD5"/>
+              </a:solidFill>
+            </a:ln>
+          </p:spPr>
+          <p:style>
+            <a:lnRef idx="2">
+              <a:schemeClr val="accent1">
+                <a:shade val="50000"/>
+              </a:schemeClr>
+            </a:lnRef>
+            <a:fillRef idx="1">
+              <a:schemeClr val="accent1"/>
+            </a:fillRef>
+            <a:effectRef idx="0">
+              <a:schemeClr val="accent1"/>
+            </a:effectRef>
+            <a:fontRef idx="minor">
+              <a:schemeClr val="lt1"/>
+            </a:fontRef>
+          </p:style>
+          <p:txBody>
+            <a:bodyPr rtlCol="0" anchor="ctr"/>
+            <a:lstStyle/>
+            <a:p>
+              <a:pPr algn="ctr"/>
+              <a:endParaRPr lang="en-US" sz="2669"/>
+            </a:p>
+          </p:txBody>
+        </p:sp>
+        <p:sp>
+          <p:nvSpPr>
+            <p:cNvPr id="6" name="Rounded Rectangle 5"/>
+            <p:cNvSpPr/>
+            <p:nvPr/>
+          </p:nvSpPr>
+          <p:spPr>
+            <a:xfrm>
+              <a:off x="12903316" y="2185688"/>
+              <a:ext cx="5857123" cy="4161772"/>
+            </a:xfrm>
+            <a:prstGeom prst="roundRect">
+              <a:avLst/>
+            </a:prstGeom>
+            <a:ln>
+              <a:solidFill>
+                <a:srgbClr val="5B9BD5"/>
+              </a:solidFill>
+            </a:ln>
+          </p:spPr>
+          <p:style>
+            <a:lnRef idx="2">
+              <a:schemeClr val="dk1"/>
+            </a:lnRef>
+            <a:fillRef idx="1">
+              <a:schemeClr val="lt1"/>
+            </a:fillRef>
+            <a:effectRef idx="0">
+              <a:schemeClr val="dk1"/>
+            </a:effectRef>
+            <a:fontRef idx="minor">
+              <a:schemeClr val="dk1"/>
+            </a:fontRef>
+          </p:style>
+          <p:txBody>
+            <a:bodyPr rtlCol="0" anchor="ctr"/>
+            <a:lstStyle/>
+            <a:p>
+              <a:pPr algn="ctr"/>
+              <a:endParaRPr lang="en-US" sz="2669"/>
+            </a:p>
+          </p:txBody>
+        </p:sp>
+        <p:sp>
+          <p:nvSpPr>
+            <p:cNvPr id="7" name="Rectangle 6"/>
+            <p:cNvSpPr/>
+            <p:nvPr/>
+          </p:nvSpPr>
+          <p:spPr>
+            <a:xfrm>
+              <a:off x="12903317" y="2104354"/>
+              <a:ext cx="5857123" cy="1014508"/>
+            </a:xfrm>
+            <a:prstGeom prst="rect">
+              <a:avLst/>
+            </a:prstGeom>
+            <a:solidFill>
+              <a:schemeClr val="tx2">
+                <a:lumMod val="40000"/>
+                <a:lumOff val="60000"/>
+              </a:schemeClr>
+            </a:solidFill>
+            <a:ln>
+              <a:solidFill>
+                <a:srgbClr val="5B9BD5"/>
+              </a:solidFill>
+            </a:ln>
+          </p:spPr>
+          <p:style>
+            <a:lnRef idx="2">
+              <a:schemeClr val="accent1">
+                <a:shade val="50000"/>
+              </a:schemeClr>
+            </a:lnRef>
+            <a:fillRef idx="1">
+              <a:schemeClr val="accent1"/>
+            </a:fillRef>
+            <a:effectRef idx="0">
+              <a:schemeClr val="accent1"/>
+            </a:effectRef>
+            <a:fontRef idx="minor">
+              <a:schemeClr val="lt1"/>
+            </a:fontRef>
+          </p:style>
+          <p:txBody>
+            <a:bodyPr rot="0" spcFirstLastPara="0" vertOverflow="overflow" horzOverflow="overflow" vert="horz" wrap="square" lIns="35721" tIns="17860" rIns="35721" bIns="17860" numCol="1" spcCol="0" rtlCol="0" fromWordArt="0" anchor="ctr" anchorCtr="0" forceAA="0" compatLnSpc="1">
+              <a:prstTxWarp prst="textNoShape">
+                <a:avLst/>
+              </a:prstTxWarp>
+              <a:noAutofit/>
+            </a:bodyPr>
+            <a:lstStyle/>
+            <a:p>
+              <a:pPr algn="ctr"/>
+              <a:endParaRPr lang="en-US" sz="2669"/>
+            </a:p>
+          </p:txBody>
+        </p:sp>
+        <p:sp>
+          <p:nvSpPr>
+            <p:cNvPr id="8" name="TextBox 7"/>
+            <p:cNvSpPr txBox="1"/>
+            <p:nvPr/>
+          </p:nvSpPr>
+          <p:spPr>
+            <a:xfrm>
+              <a:off x="14012235" y="2287047"/>
+              <a:ext cx="3513078" cy="584775"/>
+            </a:xfrm>
+            <a:prstGeom prst="rect">
+              <a:avLst/>
+            </a:prstGeom>
+            <a:noFill/>
+          </p:spPr>
+          <p:txBody>
+            <a:bodyPr wrap="none" rtlCol="0">
+              <a:spAutoFit/>
+            </a:bodyPr>
+            <a:lstStyle/>
+            <a:p>
+              <a:r>
+                <a:rPr lang="en-US" sz="3200" b="1" dirty="0" err="1"/>
+                <a:t>assignment_history</a:t>
+              </a:r>
+              <a:endParaRPr lang="en-US" sz="3200" b="1" dirty="0"/>
+            </a:p>
+          </p:txBody>
+        </p:sp>
+        <p:sp>
+          <p:nvSpPr>
+            <p:cNvPr id="9" name="TextBox 8"/>
+            <p:cNvSpPr txBox="1"/>
+            <p:nvPr/>
+          </p:nvSpPr>
+          <p:spPr>
+            <a:xfrm>
+              <a:off x="13274098" y="3425668"/>
+              <a:ext cx="3878273" cy="2677656"/>
+            </a:xfrm>
+            <a:prstGeom prst="rect">
+              <a:avLst/>
+            </a:prstGeom>
+            <a:noFill/>
+          </p:spPr>
+          <p:txBody>
+            <a:bodyPr wrap="square" rtlCol="0">
+              <a:spAutoFit/>
+            </a:bodyPr>
+            <a:lstStyle/>
+            <a:p>
+              <a:r>
+                <a:rPr lang="en-US" sz="2800" b="1" dirty="0" err="1"/>
+                <a:t>AssignmentID</a:t>
+              </a:r>
+              <a:endParaRPr lang="en-US" sz="2800" b="1" dirty="0"/>
+            </a:p>
+            <a:p>
+              <a:r>
+                <a:rPr lang="en-US" sz="2800" dirty="0" err="1" smtClean="0"/>
+                <a:t>AgentID</a:t>
+              </a:r>
+              <a:endParaRPr lang="en-US" sz="2800" dirty="0" smtClean="0"/>
+            </a:p>
+            <a:p>
+              <a:r>
+                <a:rPr lang="en-US" sz="2800" dirty="0" err="1" smtClean="0"/>
+                <a:t>CustomerName</a:t>
+              </a:r>
+              <a:endParaRPr lang="en-US" sz="2800" dirty="0"/>
+            </a:p>
+            <a:p>
+              <a:r>
+                <a:rPr lang="en-US" sz="2800" dirty="0" err="1"/>
+                <a:t>CommunicationMethod</a:t>
+              </a:r>
+              <a:endParaRPr lang="en-US" sz="2800" dirty="0"/>
+            </a:p>
+            <a:p>
+              <a:r>
+                <a:rPr lang="en-US" sz="2800" dirty="0" err="1"/>
+                <a:t>LeadSource</a:t>
+              </a:r>
+              <a:endParaRPr lang="en-US" sz="2800" dirty="0"/>
+            </a:p>
+            <a:p>
+              <a:r>
+                <a:rPr lang="en-US" sz="2800" dirty="0" err="1"/>
+                <a:t>AssignedDateTime</a:t>
+              </a:r>
+              <a:endParaRPr lang="en-US" sz="2800" dirty="0"/>
+            </a:p>
+          </p:txBody>
+        </p:sp>
+        <p:pic>
+          <p:nvPicPr>
+            <p:cNvPr id="10" name="Picture 2" descr="Free Key SVG, PNG Icon, Symbol. Download Image."/>
+            <p:cNvPicPr>
+              <a:picLocks noChangeAspect="1" noChangeArrowheads="1"/>
+            </p:cNvPicPr>
+            <p:nvPr/>
+          </p:nvPicPr>
+          <p:blipFill>
+            <a:blip r:embed="rId2" cstate="print">
+              <a:extLst>
+                <a:ext uri="{28A0092B-C50C-407E-A947-70E740481C1C}">
+                  <a14:useLocalDpi xmlns:a14="http://schemas.microsoft.com/office/drawing/2010/main" val="0"/>
+                </a:ext>
+              </a:extLst>
+            </a:blip>
+            <a:srcRect/>
+            <a:stretch>
+              <a:fillRect/>
+            </a:stretch>
+          </p:blipFill>
+          <p:spPr bwMode="auto">
+            <a:xfrm>
+              <a:off x="12988039" y="3521205"/>
+              <a:ext cx="334395" cy="334395"/>
+            </a:xfrm>
+            <a:prstGeom prst="rect">
+              <a:avLst/>
+            </a:prstGeom>
+            <a:noFill/>
+            <a:extLst>
+              <a:ext uri="{909E8E84-426E-40DD-AFC4-6F175D3DCCD1}">
+                <a14:hiddenFill xmlns:a14="http://schemas.microsoft.com/office/drawing/2010/main">
+                  <a:solidFill>
+                    <a:srgbClr val="FFFFFF"/>
+                  </a:solidFill>
+                </a14:hiddenFill>
+              </a:ext>
+            </a:extLst>
+          </p:spPr>
+        </p:pic>
+        <p:sp>
+          <p:nvSpPr>
+            <p:cNvPr id="11" name="TextBox 10"/>
+            <p:cNvSpPr txBox="1"/>
+            <p:nvPr/>
+          </p:nvSpPr>
+          <p:spPr>
+            <a:xfrm>
+              <a:off x="16984731" y="3455282"/>
+              <a:ext cx="1501245" cy="2677656"/>
+            </a:xfrm>
+            <a:prstGeom prst="rect">
+              <a:avLst/>
+            </a:prstGeom>
+            <a:noFill/>
+          </p:spPr>
+          <p:txBody>
+            <a:bodyPr wrap="none" rtlCol="0">
+              <a:spAutoFit/>
+            </a:bodyPr>
+            <a:lstStyle/>
+            <a:p>
+              <a:pPr algn="r"/>
+              <a:r>
+                <a:rPr lang="en-US" sz="2800" b="1" dirty="0" err="1"/>
+                <a:t>int</a:t>
+              </a:r>
+              <a:endParaRPr lang="en-US" sz="2800" b="1" dirty="0"/>
+            </a:p>
+            <a:p>
+              <a:pPr algn="r"/>
+              <a:r>
+                <a:rPr lang="en-US" sz="2800" dirty="0" err="1"/>
+                <a:t>int</a:t>
+              </a:r>
+              <a:endParaRPr lang="en-US" sz="2800" dirty="0"/>
+            </a:p>
+            <a:p>
+              <a:pPr algn="r"/>
+              <a:r>
+                <a:rPr lang="en-US" sz="2800" dirty="0"/>
+                <a:t>varchar</a:t>
+              </a:r>
+            </a:p>
+            <a:p>
+              <a:pPr algn="r"/>
+              <a:r>
+                <a:rPr lang="en-US" sz="2800" dirty="0"/>
+                <a:t>varchar</a:t>
+              </a:r>
+            </a:p>
+            <a:p>
+              <a:pPr algn="r"/>
+              <a:r>
+                <a:rPr lang="en-US" sz="2800" dirty="0"/>
+                <a:t>varchar</a:t>
+              </a:r>
+            </a:p>
+            <a:p>
+              <a:pPr algn="r"/>
+              <a:r>
+                <a:rPr lang="en-US" sz="2800" dirty="0" err="1"/>
+                <a:t>datetime</a:t>
+              </a:r>
+              <a:endParaRPr lang="en-US" sz="2800" dirty="0"/>
+            </a:p>
+          </p:txBody>
+        </p:sp>
+      </p:grpSp>
+    </p:spTree>
+    <p:extLst>
+      <p:ext uri="{BB962C8B-B14F-4D97-AF65-F5344CB8AC3E}">
+        <p14:creationId xmlns:p14="http://schemas.microsoft.com/office/powerpoint/2010/main" val="4008663287"/>
+      </p:ext>
+    </p:extLst>
+  </p:cSld>
+  <p:clrMapOvr>
+    <a:masterClrMapping/>
+  </p:clrMapOvr>
+</p:sld>
+</file>
+
+<file path=ppt/slides/slide9.xml><?xml version="1.0" encoding="utf-8"?>
+<p:sld xmlns:a="http://schemas.openxmlformats.org/drawingml/2006/main" xmlns:r="http://schemas.openxmlformats.org/officeDocument/2006/relationships" xmlns:p="http://schemas.openxmlformats.org/presentationml/2006/main">
+  <p:cSld>
+    <p:spTree>
+      <p:nvGrpSpPr>
+        <p:cNvPr id="1" name=""/>
+        <p:cNvGrpSpPr/>
+        <p:nvPr/>
+      </p:nvGrpSpPr>
+      <p:grpSpPr>
+        <a:xfrm>
+          <a:off x="0" y="0"/>
+          <a:ext cx="0" cy="0"/>
+          <a:chOff x="0" y="0"/>
+          <a:chExt cx="0" cy="0"/>
+        </a:xfrm>
+      </p:grpSpPr>
+      <p:grpSp>
+        <p:nvGrpSpPr>
+          <p:cNvPr id="5" name="Group 4"/>
+          <p:cNvGrpSpPr/>
+          <p:nvPr/>
+        </p:nvGrpSpPr>
+        <p:grpSpPr>
+          <a:xfrm>
+            <a:off x="6067582" y="2922825"/>
+            <a:ext cx="5965918" cy="6330397"/>
+            <a:chOff x="12903316" y="6474129"/>
+            <a:chExt cx="5965918" cy="6330397"/>
+          </a:xfrm>
+        </p:grpSpPr>
+        <p:sp>
+          <p:nvSpPr>
+            <p:cNvPr id="6" name="Rounded Rectangle 5"/>
+            <p:cNvSpPr/>
+            <p:nvPr/>
+          </p:nvSpPr>
+          <p:spPr>
+            <a:xfrm>
+              <a:off x="12903316" y="6474129"/>
+              <a:ext cx="5965918" cy="3388281"/>
+            </a:xfrm>
+            <a:prstGeom prst="roundRect">
+              <a:avLst/>
+            </a:prstGeom>
+            <a:ln>
+              <a:solidFill>
+                <a:schemeClr val="accent2"/>
+              </a:solidFill>
+            </a:ln>
+          </p:spPr>
+          <p:style>
+            <a:lnRef idx="2">
+              <a:schemeClr val="accent2">
+                <a:shade val="50000"/>
+              </a:schemeClr>
+            </a:lnRef>
+            <a:fillRef idx="1">
+              <a:schemeClr val="accent2"/>
+            </a:fillRef>
+            <a:effectRef idx="0">
+              <a:schemeClr val="accent2"/>
+            </a:effectRef>
+            <a:fontRef idx="minor">
+              <a:schemeClr val="lt1"/>
+            </a:fontRef>
+          </p:style>
+          <p:txBody>
+            <a:bodyPr rtlCol="0" anchor="ctr"/>
+            <a:lstStyle/>
+            <a:p>
+              <a:pPr algn="ctr"/>
+              <a:endParaRPr lang="en-US" sz="2669"/>
+            </a:p>
+          </p:txBody>
+        </p:sp>
+        <p:grpSp>
+          <p:nvGrpSpPr>
+            <p:cNvPr id="7" name="Group 6"/>
+            <p:cNvGrpSpPr/>
+            <p:nvPr/>
+          </p:nvGrpSpPr>
+          <p:grpSpPr>
+            <a:xfrm>
+              <a:off x="12903316" y="7082458"/>
+              <a:ext cx="5965918" cy="5722068"/>
+              <a:chOff x="12903316" y="7082458"/>
+              <a:chExt cx="5965918" cy="5722068"/>
+            </a:xfrm>
+          </p:grpSpPr>
+          <p:sp>
+            <p:nvSpPr>
+              <p:cNvPr id="8" name="Rounded Rectangle 7"/>
+              <p:cNvSpPr/>
+              <p:nvPr/>
+            </p:nvSpPr>
+            <p:spPr>
+              <a:xfrm>
+                <a:off x="12903316" y="7087987"/>
+                <a:ext cx="5965918" cy="5716539"/>
+              </a:xfrm>
+              <a:prstGeom prst="roundRect">
+                <a:avLst/>
+              </a:prstGeom>
+              <a:ln>
+                <a:solidFill>
+                  <a:schemeClr val="accent2"/>
+                </a:solidFill>
+              </a:ln>
+            </p:spPr>
+            <p:style>
+              <a:lnRef idx="2">
+                <a:schemeClr val="dk1"/>
+              </a:lnRef>
+              <a:fillRef idx="1">
+                <a:schemeClr val="lt1"/>
+              </a:fillRef>
+              <a:effectRef idx="0">
+                <a:schemeClr val="dk1"/>
+              </a:effectRef>
+              <a:fontRef idx="minor">
+                <a:schemeClr val="dk1"/>
+              </a:fontRef>
+            </p:style>
+            <p:txBody>
+              <a:bodyPr rtlCol="0" anchor="ctr"/>
+              <a:lstStyle/>
+              <a:p>
+                <a:pPr algn="ctr"/>
+                <a:endParaRPr lang="en-US" sz="2669"/>
+              </a:p>
+            </p:txBody>
+          </p:sp>
+          <p:sp>
+            <p:nvSpPr>
+              <p:cNvPr id="9" name="Rectangle 8"/>
+              <p:cNvSpPr/>
+              <p:nvPr/>
+            </p:nvSpPr>
+            <p:spPr>
+              <a:xfrm>
+                <a:off x="12903316" y="7082458"/>
+                <a:ext cx="5965918" cy="1021215"/>
+              </a:xfrm>
+              <a:prstGeom prst="rect">
+                <a:avLst/>
+              </a:prstGeom>
+              <a:solidFill>
+                <a:schemeClr val="tx2">
+                  <a:lumMod val="40000"/>
+                  <a:lumOff val="60000"/>
+                </a:schemeClr>
+              </a:solidFill>
+              <a:ln>
+                <a:solidFill>
+                  <a:schemeClr val="accent2"/>
+                </a:solidFill>
+              </a:ln>
+            </p:spPr>
+            <p:style>
+              <a:lnRef idx="2">
+                <a:schemeClr val="accent1">
+                  <a:shade val="50000"/>
+                </a:schemeClr>
+              </a:lnRef>
+              <a:fillRef idx="1">
+                <a:schemeClr val="accent1"/>
+              </a:fillRef>
+              <a:effectRef idx="0">
+                <a:schemeClr val="accent1"/>
+              </a:effectRef>
+              <a:fontRef idx="minor">
+                <a:schemeClr val="lt1"/>
+              </a:fontRef>
+            </p:style>
+            <p:txBody>
+              <a:bodyPr rot="0" spcFirstLastPara="0" vertOverflow="overflow" horzOverflow="overflow" vert="horz" wrap="square" lIns="35721" tIns="17860" rIns="35721" bIns="17860" numCol="1" spcCol="0" rtlCol="0" fromWordArt="0" anchor="ctr" anchorCtr="0" forceAA="0" compatLnSpc="1">
+                <a:prstTxWarp prst="textNoShape">
+                  <a:avLst/>
+                </a:prstTxWarp>
+                <a:noAutofit/>
+              </a:bodyPr>
+              <a:lstStyle/>
+              <a:p>
+                <a:pPr algn="ctr"/>
+                <a:endParaRPr lang="en-US" sz="2669"/>
+              </a:p>
+            </p:txBody>
+          </p:sp>
+          <p:sp>
+            <p:nvSpPr>
+              <p:cNvPr id="10" name="TextBox 9"/>
+              <p:cNvSpPr txBox="1"/>
+              <p:nvPr/>
+            </p:nvSpPr>
+            <p:spPr>
+              <a:xfrm>
+                <a:off x="15040851" y="7264550"/>
+                <a:ext cx="1721946" cy="584775"/>
+              </a:xfrm>
+              <a:prstGeom prst="rect">
+                <a:avLst/>
+              </a:prstGeom>
+              <a:noFill/>
+            </p:spPr>
+            <p:txBody>
+              <a:bodyPr wrap="none" rtlCol="0">
+                <a:spAutoFit/>
+              </a:bodyPr>
+              <a:lstStyle/>
+              <a:p>
+                <a:r>
+                  <a:rPr lang="en-US" sz="3200" b="1" dirty="0"/>
+                  <a:t>bookings</a:t>
+                </a:r>
+              </a:p>
+            </p:txBody>
+          </p:sp>
+          <p:sp>
+            <p:nvSpPr>
+              <p:cNvPr id="11" name="TextBox 10"/>
+              <p:cNvSpPr txBox="1"/>
+              <p:nvPr/>
+            </p:nvSpPr>
+            <p:spPr>
+              <a:xfrm>
+                <a:off x="13378270" y="8280235"/>
+                <a:ext cx="3453061" cy="4401205"/>
+              </a:xfrm>
+              <a:prstGeom prst="rect">
+                <a:avLst/>
+              </a:prstGeom>
+              <a:noFill/>
+            </p:spPr>
+            <p:txBody>
+              <a:bodyPr wrap="none" rtlCol="0">
+                <a:spAutoFit/>
+              </a:bodyPr>
+              <a:lstStyle/>
+              <a:p>
+                <a:r>
+                  <a:rPr lang="en-US" sz="2800" b="1" dirty="0" err="1"/>
+                  <a:t>BookingID</a:t>
+                </a:r>
+                <a:endParaRPr lang="en-US" sz="2800" b="1" dirty="0"/>
+              </a:p>
+              <a:p>
+                <a:r>
+                  <a:rPr lang="en-US" sz="2800" dirty="0" err="1"/>
+                  <a:t>AssignmentID</a:t>
+                </a:r>
+                <a:endParaRPr lang="en-US" sz="2800" dirty="0"/>
+              </a:p>
+              <a:p>
+                <a:r>
+                  <a:rPr lang="en-US" sz="2800" dirty="0" err="1"/>
+                  <a:t>BookingCompleteDate</a:t>
+                </a:r>
+                <a:endParaRPr lang="en-US" sz="2800" dirty="0"/>
+              </a:p>
+              <a:p>
+                <a:r>
+                  <a:rPr lang="en-US" sz="2800" dirty="0" err="1" smtClean="0"/>
+                  <a:t>CancelledDate</a:t>
+                </a:r>
+                <a:endParaRPr lang="en-US" sz="2800" dirty="0" smtClean="0"/>
+              </a:p>
+              <a:p>
+                <a:r>
+                  <a:rPr lang="en-US" sz="2800" dirty="0" smtClean="0"/>
+                  <a:t>Destination</a:t>
+                </a:r>
+                <a:endParaRPr lang="en-US" sz="2800" dirty="0"/>
+              </a:p>
+              <a:p>
+                <a:r>
+                  <a:rPr lang="en-US" sz="2800" dirty="0"/>
+                  <a:t>Package</a:t>
+                </a:r>
+              </a:p>
+              <a:p>
+                <a:r>
+                  <a:rPr lang="en-US" sz="2800" dirty="0" err="1"/>
+                  <a:t>LaunchLocation</a:t>
+                </a:r>
+                <a:endParaRPr lang="en-US" sz="2800" dirty="0"/>
+              </a:p>
+              <a:p>
+                <a:r>
+                  <a:rPr lang="en-US" sz="2800" dirty="0" err="1"/>
+                  <a:t>PackageRevenue</a:t>
+                </a:r>
+                <a:endParaRPr lang="en-US" sz="2800" dirty="0"/>
+              </a:p>
+              <a:p>
+                <a:r>
+                  <a:rPr lang="en-US" sz="2800" dirty="0" err="1"/>
+                  <a:t>TotalRevenue</a:t>
+                </a:r>
+                <a:endParaRPr lang="en-US" sz="2800" dirty="0"/>
+              </a:p>
+              <a:p>
+                <a:r>
+                  <a:rPr lang="en-US" sz="2800" dirty="0" err="1"/>
+                  <a:t>BookingStatus</a:t>
+                </a:r>
+                <a:endParaRPr lang="en-US" sz="2800" dirty="0"/>
+              </a:p>
+            </p:txBody>
+          </p:sp>
+          <p:sp>
+            <p:nvSpPr>
+              <p:cNvPr id="12" name="TextBox 11"/>
+              <p:cNvSpPr txBox="1"/>
+              <p:nvPr/>
+            </p:nvSpPr>
+            <p:spPr>
+              <a:xfrm>
+                <a:off x="16984667" y="8269828"/>
+                <a:ext cx="1501308" cy="4401205"/>
+              </a:xfrm>
+              <a:prstGeom prst="rect">
+                <a:avLst/>
+              </a:prstGeom>
+              <a:noFill/>
+            </p:spPr>
+            <p:txBody>
+              <a:bodyPr wrap="none" rtlCol="0">
+                <a:spAutoFit/>
+              </a:bodyPr>
+              <a:lstStyle/>
+              <a:p>
+                <a:pPr algn="r"/>
+                <a:r>
+                  <a:rPr lang="en-US" sz="2800" b="1" dirty="0" err="1"/>
+                  <a:t>int</a:t>
+                </a:r>
+                <a:endParaRPr lang="en-US" sz="2800" b="1" dirty="0"/>
+              </a:p>
+              <a:p>
+                <a:pPr algn="r"/>
+                <a:r>
+                  <a:rPr lang="en-US" sz="2800" dirty="0" err="1"/>
+                  <a:t>int</a:t>
+                </a:r>
+                <a:endParaRPr lang="en-US" sz="2800" dirty="0"/>
+              </a:p>
+              <a:p>
+                <a:pPr algn="r"/>
+                <a:r>
+                  <a:rPr lang="en-US" sz="2800" dirty="0" err="1"/>
+                  <a:t>datetime</a:t>
+                </a:r>
+                <a:endParaRPr lang="en-US" sz="2800" dirty="0"/>
+              </a:p>
+              <a:p>
+                <a:pPr algn="r"/>
+                <a:r>
+                  <a:rPr lang="en-US" sz="2800" dirty="0" err="1"/>
+                  <a:t>datetime</a:t>
+                </a:r>
+                <a:endParaRPr lang="en-US" sz="2800" dirty="0"/>
+              </a:p>
+              <a:p>
+                <a:pPr algn="r"/>
+                <a:r>
+                  <a:rPr lang="en-US" sz="2800" dirty="0" smtClean="0"/>
+                  <a:t>varchar</a:t>
+                </a:r>
+              </a:p>
+              <a:p>
+                <a:pPr algn="r"/>
+                <a:r>
+                  <a:rPr lang="en-US" sz="2800" dirty="0" smtClean="0"/>
+                  <a:t>varchar</a:t>
+                </a:r>
+                <a:endParaRPr lang="en-US" sz="2800" dirty="0"/>
+              </a:p>
+              <a:p>
+                <a:pPr algn="r"/>
+                <a:r>
+                  <a:rPr lang="en-US" sz="2800" dirty="0"/>
+                  <a:t>varchar</a:t>
+                </a:r>
+              </a:p>
+              <a:p>
+                <a:pPr algn="r"/>
+                <a:r>
+                  <a:rPr lang="en-US" sz="2800" dirty="0"/>
+                  <a:t>decimal</a:t>
+                </a:r>
+              </a:p>
+              <a:p>
+                <a:pPr algn="r"/>
+                <a:r>
+                  <a:rPr lang="en-US" sz="2800" dirty="0"/>
+                  <a:t>decimal</a:t>
+                </a:r>
+              </a:p>
+              <a:p>
+                <a:pPr algn="r"/>
+                <a:r>
+                  <a:rPr lang="en-US" sz="2800" dirty="0"/>
+                  <a:t>varchar</a:t>
+                </a:r>
+              </a:p>
+            </p:txBody>
+          </p:sp>
+          <p:pic>
+            <p:nvPicPr>
+              <p:cNvPr id="13" name="Picture 2" descr="Free Key SVG, PNG Icon, Symbol. Download Image."/>
+              <p:cNvPicPr>
+                <a:picLocks noChangeAspect="1" noChangeArrowheads="1"/>
+              </p:cNvPicPr>
+              <p:nvPr/>
+            </p:nvPicPr>
+            <p:blipFill>
+              <a:blip r:embed="rId2" cstate="print">
+                <a:extLst>
+                  <a:ext uri="{28A0092B-C50C-407E-A947-70E740481C1C}">
+                    <a14:useLocalDpi xmlns:a14="http://schemas.microsoft.com/office/drawing/2010/main" val="0"/>
+                  </a:ext>
+                </a:extLst>
+              </a:blip>
+              <a:srcRect/>
+              <a:stretch>
+                <a:fillRect/>
+              </a:stretch>
+            </p:blipFill>
+            <p:spPr bwMode="auto">
+              <a:xfrm>
+                <a:off x="13063526" y="8386406"/>
+                <a:ext cx="334395" cy="334395"/>
+              </a:xfrm>
+              <a:prstGeom prst="rect">
+                <a:avLst/>
+              </a:prstGeom>
+              <a:noFill/>
+              <a:extLst>
+                <a:ext uri="{909E8E84-426E-40DD-AFC4-6F175D3DCCD1}">
+                  <a14:hiddenFill xmlns:a14="http://schemas.microsoft.com/office/drawing/2010/main">
+                    <a:solidFill>
+                      <a:srgbClr val="FFFFFF"/>
+                    </a:solidFill>
+                  </a14:hiddenFill>
+                </a:ext>
+              </a:extLst>
+            </p:spPr>
+          </p:pic>
+        </p:grpSp>
+      </p:grpSp>
+    </p:spTree>
+    <p:extLst>
+      <p:ext uri="{BB962C8B-B14F-4D97-AF65-F5344CB8AC3E}">
+        <p14:creationId xmlns:p14="http://schemas.microsoft.com/office/powerpoint/2010/main" val="205018567"/>
+      </p:ext>
+    </p:extLst>
+  </p:cSld>
+  <p:clrMapOvr>
+    <a:masterClrMapping/>
+  </p:clrMapOvr>
+</p:sld>
+</file>
+
 <file path=ppt/theme/theme1.xml><?xml version="1.0" encoding="utf-8"?>
 <a:theme xmlns:a="http://schemas.openxmlformats.org/drawingml/2006/main" name="Office Theme">
   <a:themeElements>

</xml_diff>

<commit_message>
Added space_travel_agent.jpg to Figures.
</commit_message>
<xml_diff>
--- a/Figures/figure.pptx
+++ b/Figures/figure.pptx
@@ -16,6 +16,7 @@
     <p:sldId id="268" r:id="rId10"/>
     <p:sldId id="269" r:id="rId11"/>
     <p:sldId id="270" r:id="rId12"/>
+    <p:sldId id="271" r:id="rId13"/>
   </p:sldIdLst>
   <p:sldSz cx="18897600" cy="14173200"/>
   <p:notesSz cx="6858000" cy="9144000"/>
@@ -5122,6 +5123,457 @@
 </p:sld>
 </file>
 
+<file path=ppt/slides/slide12.xml><?xml version="1.0" encoding="utf-8"?>
+<p:sld xmlns:a="http://schemas.openxmlformats.org/drawingml/2006/main" xmlns:r="http://schemas.openxmlformats.org/officeDocument/2006/relationships" xmlns:p="http://schemas.openxmlformats.org/presentationml/2006/main">
+  <p:cSld>
+    <p:spTree>
+      <p:nvGrpSpPr>
+        <p:cNvPr id="1" name=""/>
+        <p:cNvGrpSpPr/>
+        <p:nvPr/>
+      </p:nvGrpSpPr>
+      <p:grpSpPr>
+        <a:xfrm>
+          <a:off x="0" y="0"/>
+          <a:ext cx="0" cy="0"/>
+          <a:chOff x="0" y="0"/>
+          <a:chExt cx="0" cy="0"/>
+        </a:xfrm>
+      </p:grpSpPr>
+      <p:grpSp>
+        <p:nvGrpSpPr>
+          <p:cNvPr id="14" name="Group 13"/>
+          <p:cNvGrpSpPr/>
+          <p:nvPr/>
+        </p:nvGrpSpPr>
+        <p:grpSpPr>
+          <a:xfrm>
+            <a:off x="2964515" y="3531134"/>
+            <a:ext cx="12563510" cy="6136971"/>
+            <a:chOff x="-737270" y="3231181"/>
+            <a:chExt cx="12563510" cy="6136971"/>
+          </a:xfrm>
+        </p:grpSpPr>
+        <p:grpSp>
+          <p:nvGrpSpPr>
+            <p:cNvPr id="15" name="Group 14"/>
+            <p:cNvGrpSpPr/>
+            <p:nvPr/>
+          </p:nvGrpSpPr>
+          <p:grpSpPr>
+            <a:xfrm>
+              <a:off x="1825956" y="3231181"/>
+              <a:ext cx="7279944" cy="6136971"/>
+              <a:chOff x="1825956" y="3231181"/>
+              <a:chExt cx="7279944" cy="6136971"/>
+            </a:xfrm>
+          </p:grpSpPr>
+          <p:sp>
+            <p:nvSpPr>
+              <p:cNvPr id="18" name="Rounded Rectangle 17"/>
+              <p:cNvSpPr/>
+              <p:nvPr/>
+            </p:nvSpPr>
+            <p:spPr>
+              <a:xfrm>
+                <a:off x="1825956" y="3231181"/>
+                <a:ext cx="7279944" cy="3388281"/>
+              </a:xfrm>
+              <a:prstGeom prst="roundRect">
+                <a:avLst/>
+              </a:prstGeom>
+              <a:solidFill>
+                <a:srgbClr val="7030A0"/>
+              </a:solidFill>
+              <a:ln>
+                <a:solidFill>
+                  <a:srgbClr val="7030A0"/>
+                </a:solidFill>
+              </a:ln>
+            </p:spPr>
+            <p:style>
+              <a:lnRef idx="2">
+                <a:schemeClr val="accent2">
+                  <a:shade val="50000"/>
+                </a:schemeClr>
+              </a:lnRef>
+              <a:fillRef idx="1">
+                <a:schemeClr val="accent2"/>
+              </a:fillRef>
+              <a:effectRef idx="0">
+                <a:schemeClr val="accent2"/>
+              </a:effectRef>
+              <a:fontRef idx="minor">
+                <a:schemeClr val="lt1"/>
+              </a:fontRef>
+            </p:style>
+            <p:txBody>
+              <a:bodyPr rtlCol="0" anchor="ctr"/>
+              <a:lstStyle/>
+              <a:p>
+                <a:pPr algn="ctr"/>
+                <a:endParaRPr lang="en-US" sz="2669"/>
+              </a:p>
+            </p:txBody>
+          </p:sp>
+          <p:sp>
+            <p:nvSpPr>
+              <p:cNvPr id="19" name="Rounded Rectangle 18"/>
+              <p:cNvSpPr/>
+              <p:nvPr/>
+            </p:nvSpPr>
+            <p:spPr>
+              <a:xfrm>
+                <a:off x="1825956" y="3845040"/>
+                <a:ext cx="7279944" cy="5523112"/>
+              </a:xfrm>
+              <a:prstGeom prst="roundRect">
+                <a:avLst/>
+              </a:prstGeom>
+              <a:ln>
+                <a:solidFill>
+                  <a:srgbClr val="7030A0"/>
+                </a:solidFill>
+              </a:ln>
+            </p:spPr>
+            <p:style>
+              <a:lnRef idx="2">
+                <a:schemeClr val="dk1"/>
+              </a:lnRef>
+              <a:fillRef idx="1">
+                <a:schemeClr val="lt1"/>
+              </a:fillRef>
+              <a:effectRef idx="0">
+                <a:schemeClr val="dk1"/>
+              </a:effectRef>
+              <a:fontRef idx="minor">
+                <a:schemeClr val="dk1"/>
+              </a:fontRef>
+            </p:style>
+            <p:txBody>
+              <a:bodyPr rtlCol="0" anchor="ctr"/>
+              <a:lstStyle/>
+              <a:p>
+                <a:pPr algn="ctr"/>
+                <a:endParaRPr lang="en-US" sz="2669"/>
+              </a:p>
+            </p:txBody>
+          </p:sp>
+          <p:sp>
+            <p:nvSpPr>
+              <p:cNvPr id="20" name="Rectangle 19"/>
+              <p:cNvSpPr/>
+              <p:nvPr/>
+            </p:nvSpPr>
+            <p:spPr>
+              <a:xfrm>
+                <a:off x="1825956" y="3839510"/>
+                <a:ext cx="7279944" cy="1021215"/>
+              </a:xfrm>
+              <a:prstGeom prst="rect">
+                <a:avLst/>
+              </a:prstGeom>
+              <a:solidFill>
+                <a:schemeClr val="tx2">
+                  <a:lumMod val="40000"/>
+                  <a:lumOff val="60000"/>
+                </a:schemeClr>
+              </a:solidFill>
+              <a:ln>
+                <a:solidFill>
+                  <a:srgbClr val="7030A0"/>
+                </a:solidFill>
+              </a:ln>
+            </p:spPr>
+            <p:style>
+              <a:lnRef idx="2">
+                <a:schemeClr val="accent1">
+                  <a:shade val="50000"/>
+                </a:schemeClr>
+              </a:lnRef>
+              <a:fillRef idx="1">
+                <a:schemeClr val="accent1"/>
+              </a:fillRef>
+              <a:effectRef idx="0">
+                <a:schemeClr val="accent1"/>
+              </a:effectRef>
+              <a:fontRef idx="minor">
+                <a:schemeClr val="lt1"/>
+              </a:fontRef>
+            </p:style>
+            <p:txBody>
+              <a:bodyPr rot="0" spcFirstLastPara="0" vertOverflow="overflow" horzOverflow="overflow" vert="horz" wrap="square" lIns="35721" tIns="17860" rIns="35721" bIns="17860" numCol="1" spcCol="0" rtlCol="0" fromWordArt="0" anchor="ctr" anchorCtr="0" forceAA="0" compatLnSpc="1">
+                <a:prstTxWarp prst="textNoShape">
+                  <a:avLst/>
+                </a:prstTxWarp>
+                <a:noAutofit/>
+              </a:bodyPr>
+              <a:lstStyle/>
+              <a:p>
+                <a:pPr algn="ctr"/>
+                <a:endParaRPr lang="en-US" sz="2669"/>
+              </a:p>
+            </p:txBody>
+          </p:sp>
+          <p:pic>
+            <p:nvPicPr>
+              <p:cNvPr id="21" name="Picture 2" descr="Free Key SVG, PNG Icon, Symbol. Download Image."/>
+              <p:cNvPicPr>
+                <a:picLocks noChangeAspect="1" noChangeArrowheads="1"/>
+              </p:cNvPicPr>
+              <p:nvPr/>
+            </p:nvPicPr>
+            <p:blipFill>
+              <a:blip r:embed="rId2" cstate="print">
+                <a:extLst>
+                  <a:ext uri="{28A0092B-C50C-407E-A947-70E740481C1C}">
+                    <a14:useLocalDpi xmlns:a14="http://schemas.microsoft.com/office/drawing/2010/main" val="0"/>
+                  </a:ext>
+                </a:extLst>
+              </a:blip>
+              <a:srcRect/>
+              <a:stretch>
+                <a:fillRect/>
+              </a:stretch>
+            </p:blipFill>
+            <p:spPr bwMode="auto">
+              <a:xfrm>
+                <a:off x="1983070" y="5066079"/>
+                <a:ext cx="334395" cy="334395"/>
+              </a:xfrm>
+              <a:prstGeom prst="rect">
+                <a:avLst/>
+              </a:prstGeom>
+              <a:noFill/>
+              <a:ln>
+                <a:noFill/>
+              </a:ln>
+              <a:extLst>
+                <a:ext uri="{909E8E84-426E-40DD-AFC4-6F175D3DCCD1}">
+                  <a14:hiddenFill xmlns:a14="http://schemas.microsoft.com/office/drawing/2010/main">
+                    <a:solidFill>
+                      <a:srgbClr val="FFFFFF"/>
+                    </a:solidFill>
+                  </a14:hiddenFill>
+                </a:ext>
+              </a:extLst>
+            </p:spPr>
+          </p:pic>
+          <p:sp>
+            <p:nvSpPr>
+              <p:cNvPr id="26" name="Rectangle 25"/>
+              <p:cNvSpPr/>
+              <p:nvPr/>
+            </p:nvSpPr>
+            <p:spPr>
+              <a:xfrm>
+                <a:off x="3493038" y="4053973"/>
+                <a:ext cx="3652347" cy="584775"/>
+              </a:xfrm>
+              <a:prstGeom prst="rect">
+                <a:avLst/>
+              </a:prstGeom>
+            </p:spPr>
+            <p:txBody>
+              <a:bodyPr wrap="none">
+                <a:spAutoFit/>
+              </a:bodyPr>
+              <a:lstStyle/>
+              <a:p>
+                <a:r>
+                  <a:rPr lang="en-US" sz="3200" b="1" dirty="0" err="1"/>
+                  <a:t>space_travel_agents</a:t>
+                </a:r>
+                <a:endParaRPr lang="en-US" sz="3200" dirty="0"/>
+              </a:p>
+            </p:txBody>
+          </p:sp>
+        </p:grpSp>
+        <p:sp>
+          <p:nvSpPr>
+            <p:cNvPr id="16" name="Rectangle 15"/>
+            <p:cNvSpPr/>
+            <p:nvPr/>
+          </p:nvSpPr>
+          <p:spPr>
+            <a:xfrm>
+              <a:off x="2377440" y="4983831"/>
+              <a:ext cx="9448800" cy="3970318"/>
+            </a:xfrm>
+            <a:prstGeom prst="rect">
+              <a:avLst/>
+            </a:prstGeom>
+          </p:spPr>
+          <p:txBody>
+            <a:bodyPr>
+              <a:spAutoFit/>
+            </a:bodyPr>
+            <a:lstStyle/>
+            <a:p>
+              <a:r>
+                <a:rPr lang="en-US" sz="2800" b="1" dirty="0" err="1"/>
+                <a:t>AgentID</a:t>
+              </a:r>
+              <a:endParaRPr lang="en-US" sz="2800" b="1" dirty="0"/>
+            </a:p>
+            <a:p>
+              <a:r>
+                <a:rPr lang="en-US" sz="2800" dirty="0" err="1"/>
+                <a:t>FirstName</a:t>
+              </a:r>
+              <a:endParaRPr lang="en-US" sz="2800" dirty="0"/>
+            </a:p>
+            <a:p>
+              <a:r>
+                <a:rPr lang="en-US" sz="2800" dirty="0" err="1"/>
+                <a:t>LastName</a:t>
+              </a:r>
+              <a:endParaRPr lang="en-US" sz="2800" dirty="0"/>
+            </a:p>
+            <a:p>
+              <a:r>
+                <a:rPr lang="en-US" sz="2800" dirty="0"/>
+                <a:t>Email</a:t>
+              </a:r>
+            </a:p>
+            <a:p>
+              <a:r>
+                <a:rPr lang="en-US" sz="2800" dirty="0" err="1"/>
+                <a:t>JobTitle</a:t>
+              </a:r>
+              <a:endParaRPr lang="en-US" sz="2800" dirty="0"/>
+            </a:p>
+            <a:p>
+              <a:r>
+                <a:rPr lang="en-US" sz="2800" dirty="0" err="1"/>
+                <a:t>DepartmentName</a:t>
+              </a:r>
+              <a:endParaRPr lang="en-US" sz="2800" dirty="0"/>
+            </a:p>
+            <a:p>
+              <a:r>
+                <a:rPr lang="en-US" sz="2800" dirty="0" err="1"/>
+                <a:t>ManagerName</a:t>
+              </a:r>
+              <a:endParaRPr lang="en-US" sz="2800" dirty="0"/>
+            </a:p>
+            <a:p>
+              <a:r>
+                <a:rPr lang="en-US" sz="2800" dirty="0" err="1"/>
+                <a:t>YearsOfService</a:t>
+              </a:r>
+              <a:endParaRPr lang="en-US" sz="2800" dirty="0"/>
+            </a:p>
+            <a:p>
+              <a:r>
+                <a:rPr lang="en-US" sz="2800" dirty="0" err="1"/>
+                <a:t>AverageCustomerServiceRating</a:t>
+              </a:r>
+              <a:endParaRPr lang="en-US" sz="2800" dirty="0"/>
+            </a:p>
+          </p:txBody>
+        </p:sp>
+        <p:sp>
+          <p:nvSpPr>
+            <p:cNvPr id="17" name="Rectangle 16"/>
+            <p:cNvSpPr/>
+            <p:nvPr/>
+          </p:nvSpPr>
+          <p:spPr>
+            <a:xfrm>
+              <a:off x="-737270" y="5001546"/>
+              <a:ext cx="9448800" cy="3970318"/>
+            </a:xfrm>
+            <a:prstGeom prst="rect">
+              <a:avLst/>
+            </a:prstGeom>
+          </p:spPr>
+          <p:txBody>
+            <a:bodyPr>
+              <a:spAutoFit/>
+            </a:bodyPr>
+            <a:lstStyle/>
+            <a:p>
+              <a:pPr algn="r"/>
+              <a:r>
+                <a:rPr lang="en-US" sz="2800" b="1" dirty="0" err="1"/>
+                <a:t>int</a:t>
+              </a:r>
+              <a:endParaRPr lang="en-US" sz="2800" b="1" dirty="0"/>
+            </a:p>
+            <a:p>
+              <a:pPr algn="r"/>
+              <a:r>
+                <a:rPr lang="en-US" sz="2800" dirty="0"/>
+                <a:t>varchar</a:t>
+              </a:r>
+            </a:p>
+            <a:p>
+              <a:pPr algn="r"/>
+              <a:r>
+                <a:rPr lang="en-US" sz="2800" dirty="0"/>
+                <a:t>varchar</a:t>
+              </a:r>
+            </a:p>
+            <a:p>
+              <a:pPr algn="r"/>
+              <a:r>
+                <a:rPr lang="en-US" sz="2800" dirty="0"/>
+                <a:t>varchar</a:t>
+              </a:r>
+            </a:p>
+            <a:p>
+              <a:pPr algn="r"/>
+              <a:r>
+                <a:rPr lang="en-US" sz="2800" dirty="0"/>
+                <a:t>varchar</a:t>
+              </a:r>
+            </a:p>
+            <a:p>
+              <a:pPr algn="r"/>
+              <a:r>
+                <a:rPr lang="en-US" sz="2800" dirty="0"/>
+                <a:t>varchar</a:t>
+              </a:r>
+            </a:p>
+            <a:p>
+              <a:pPr algn="r"/>
+              <a:r>
+                <a:rPr lang="en-US" sz="2800" dirty="0"/>
+                <a:t>varchar</a:t>
+              </a:r>
+            </a:p>
+            <a:p>
+              <a:pPr algn="r"/>
+              <a:r>
+                <a:rPr lang="en-US" sz="2800" dirty="0" err="1"/>
+                <a:t>int</a:t>
+              </a:r>
+              <a:endParaRPr lang="en-US" sz="2800" dirty="0"/>
+            </a:p>
+            <a:p>
+              <a:pPr algn="r"/>
+              <a:r>
+                <a:rPr lang="en-US" sz="2800" dirty="0"/>
+                <a:t>float</a:t>
+              </a:r>
+            </a:p>
+          </p:txBody>
+        </p:sp>
+      </p:grpSp>
+    </p:spTree>
+    <p:extLst>
+      <p:ext uri="{BB962C8B-B14F-4D97-AF65-F5344CB8AC3E}">
+        <p14:creationId xmlns:p14="http://schemas.microsoft.com/office/powerpoint/2010/main" val="1647389003"/>
+      </p:ext>
+    </p:extLst>
+  </p:cSld>
+  <p:clrMapOvr>
+    <a:masterClrMapping/>
+  </p:clrMapOvr>
+</p:sld>
+</file>
+
 <file path=ppt/slides/slide2.xml><?xml version="1.0" encoding="utf-8"?>
 <p:sld xmlns:a="http://schemas.openxmlformats.org/drawingml/2006/main" xmlns:r="http://schemas.openxmlformats.org/officeDocument/2006/relationships" xmlns:p="http://schemas.openxmlformats.org/presentationml/2006/main">
   <p:cSld>

</xml_diff>